<commit_message>
Start depth image invisible
</commit_message>
<xml_diff>
--- a/Spooky Proxemic.pptx
+++ b/Spooky Proxemic.pptx
@@ -5039,8 +5039,8 @@
         </p:blipFill>
         <p:spPr>
           <a:xfrm>
-            <a:off x="609600" y="2692581"/>
-            <a:ext cx="4283674" cy="2032000"/>
+            <a:off x="381000" y="2590800"/>
+            <a:ext cx="4604568" cy="2184219"/>
           </a:xfrm>
           <a:prstGeom prst="rect">
             <a:avLst/>
@@ -5190,8 +5190,8 @@
         </p:blipFill>
         <p:spPr>
           <a:xfrm>
-            <a:off x="609600" y="2692581"/>
-            <a:ext cx="4284421" cy="2032000"/>
+            <a:off x="609600" y="2667000"/>
+            <a:ext cx="4605371" cy="2184219"/>
           </a:xfrm>
           <a:prstGeom prst="rect">
             <a:avLst/>

</xml_diff>